<commit_message>
added preview of futamura
</commit_message>
<xml_diff>
--- a/slides/04-Decorators.pptx
+++ b/slides/04-Decorators.pptx
@@ -9618,7 +9618,7 @@
         <p:spPr>
           <a:xfrm>
             <a:off x="2848470" y="287676"/>
-            <a:ext cx="6495060" cy="6287785"/>
+            <a:ext cx="6495060" cy="6431623"/>
           </a:xfrm>
           <a:prstGeom prst="rect">
             <a:avLst/>
@@ -9631,7 +9631,7 @@
         </p:spPr>
         <p:txBody>
           <a:bodyPr vert="horz" lIns="91440" tIns="45720" rIns="91440" bIns="45720" rtlCol="0">
-            <a:normAutofit/>
+            <a:normAutofit lnSpcReduction="10000"/>
           </a:bodyPr>
           <a:lstStyle>
             <a:lvl1pPr marL="384048" indent="-384048" algn="l" defTabSz="914400" rtl="0" eaLnBrk="1" latinLnBrk="0" hangingPunct="1">
@@ -9829,7 +9829,7 @@
               <a:buNone/>
             </a:pPr>
             <a:r>
-              <a:rPr lang="en-US" dirty="0">
+              <a:rPr lang="en-US" sz="2300" dirty="0">
                 <a:latin typeface="Consolas" panose="020B0609020204030204" pitchFamily="49" charset="0"/>
                 <a:ea typeface="Menlo" panose="020B0609030804020204" pitchFamily="49" charset="0"/>
                 <a:cs typeface="Consolas" panose="020B0609020204030204" pitchFamily="49" charset="0"/>
@@ -9837,7 +9837,7 @@
               <a:t>&gt;&gt;&gt; </a:t>
             </a:r>
             <a:r>
-              <a:rPr lang="en-US" dirty="0">
+              <a:rPr lang="en-US" sz="2300" dirty="0">
                 <a:solidFill>
                   <a:schemeClr val="accent6"/>
                 </a:solidFill>
@@ -9848,7 +9848,7 @@
               <a:t>from </a:t>
             </a:r>
             <a:r>
-              <a:rPr lang="en-US" dirty="0" err="1">
+              <a:rPr lang="en-US" sz="2300" dirty="0" err="1">
                 <a:solidFill>
                   <a:schemeClr val="accent6"/>
                 </a:solidFill>
@@ -9859,7 +9859,7 @@
               <a:t>functools</a:t>
             </a:r>
             <a:r>
-              <a:rPr lang="en-US" dirty="0">
+              <a:rPr lang="en-US" sz="2300" dirty="0">
                 <a:solidFill>
                   <a:schemeClr val="accent6"/>
                 </a:solidFill>
@@ -9875,7 +9875,7 @@
               <a:buNone/>
             </a:pPr>
             <a:r>
-              <a:rPr lang="en-US" dirty="0">
+              <a:rPr lang="en-US" sz="2300" dirty="0">
                 <a:latin typeface="Consolas" panose="020B0609020204030204" pitchFamily="49" charset="0"/>
                 <a:ea typeface="Menlo" panose="020B0609030804020204" pitchFamily="49" charset="0"/>
                 <a:cs typeface="Consolas" panose="020B0609020204030204" pitchFamily="49" charset="0"/>
@@ -9883,7 +9883,7 @@
               <a:t>&gt;&gt;&gt; </a:t>
             </a:r>
             <a:r>
-              <a:rPr lang="en-US" dirty="0">
+              <a:rPr lang="en-US" sz="2300" dirty="0">
                 <a:solidFill>
                   <a:srgbClr val="E700E5"/>
                 </a:solidFill>
@@ -9899,7 +9899,7 @@
               <a:buNone/>
             </a:pPr>
             <a:r>
-              <a:rPr lang="en-US" dirty="0">
+              <a:rPr lang="en-US" sz="2300" dirty="0">
                 <a:latin typeface="Consolas" panose="020B0609020204030204" pitchFamily="49" charset="0"/>
                 <a:ea typeface="Menlo" panose="020B0609030804020204" pitchFamily="49" charset="0"/>
                 <a:cs typeface="Consolas" panose="020B0609020204030204" pitchFamily="49" charset="0"/>
@@ -9907,7 +9907,7 @@
               <a:t>... </a:t>
             </a:r>
             <a:r>
-              <a:rPr lang="en-US" dirty="0">
+              <a:rPr lang="en-US" sz="2300" dirty="0">
                 <a:solidFill>
                   <a:schemeClr val="accent6"/>
                 </a:solidFill>
@@ -9923,7 +9923,7 @@
               <a:buNone/>
             </a:pPr>
             <a:r>
-              <a:rPr lang="en-US" dirty="0">
+              <a:rPr lang="en-US" sz="2300" dirty="0">
                 <a:latin typeface="Consolas" panose="020B0609020204030204" pitchFamily="49" charset="0"/>
                 <a:ea typeface="Menlo" panose="020B0609030804020204" pitchFamily="49" charset="0"/>
                 <a:cs typeface="Consolas" panose="020B0609020204030204" pitchFamily="49" charset="0"/>
@@ -9931,7 +9931,7 @@
               <a:t>...     </a:t>
             </a:r>
             <a:r>
-              <a:rPr lang="en-US" dirty="0">
+              <a:rPr lang="en-US" sz="2300" dirty="0">
                 <a:solidFill>
                   <a:schemeClr val="accent6"/>
                 </a:solidFill>
@@ -9947,7 +9947,7 @@
               <a:buNone/>
             </a:pPr>
             <a:r>
-              <a:rPr lang="en-US" dirty="0">
+              <a:rPr lang="en-US" sz="2300" dirty="0">
                 <a:latin typeface="Consolas" panose="020B0609020204030204" pitchFamily="49" charset="0"/>
                 <a:ea typeface="Menlo" panose="020B0609030804020204" pitchFamily="49" charset="0"/>
                 <a:cs typeface="Consolas" panose="020B0609020204030204" pitchFamily="49" charset="0"/>
@@ -9960,7 +9960,7 @@
               <a:buNone/>
             </a:pPr>
             <a:r>
-              <a:rPr lang="en-US" dirty="0">
+              <a:rPr lang="en-US" sz="2300" dirty="0">
                 <a:latin typeface="Consolas" panose="020B0609020204030204" pitchFamily="49" charset="0"/>
                 <a:ea typeface="Menlo" panose="020B0609030804020204" pitchFamily="49" charset="0"/>
                 <a:cs typeface="Consolas" panose="020B0609020204030204" pitchFamily="49" charset="0"/>
@@ -9968,7 +9968,7 @@
               <a:t>&gt;&gt;&gt; </a:t>
             </a:r>
             <a:r>
-              <a:rPr lang="en-US" dirty="0">
+              <a:rPr lang="en-US" sz="2300" dirty="0">
                 <a:solidFill>
                   <a:schemeClr val="accent6"/>
                 </a:solidFill>
@@ -9984,7 +9984,7 @@
               <a:buNone/>
             </a:pPr>
             <a:r>
-              <a:rPr lang="en-US" dirty="0">
+              <a:rPr lang="en-US" sz="2300" dirty="0">
                 <a:latin typeface="Consolas" panose="020B0609020204030204" pitchFamily="49" charset="0"/>
                 <a:ea typeface="Menlo" panose="020B0609030804020204" pitchFamily="49" charset="0"/>
                 <a:cs typeface="Consolas" panose="020B0609020204030204" pitchFamily="49" charset="0"/>
@@ -9997,7 +9997,7 @@
               <a:buNone/>
             </a:pPr>
             <a:r>
-              <a:rPr lang="en-US" dirty="0">
+              <a:rPr lang="en-US" sz="2300" dirty="0">
                 <a:latin typeface="Consolas" panose="020B0609020204030204" pitchFamily="49" charset="0"/>
                 <a:ea typeface="Menlo" panose="020B0609030804020204" pitchFamily="49" charset="0"/>
                 <a:cs typeface="Consolas" panose="020B0609020204030204" pitchFamily="49" charset="0"/>
@@ -10005,26 +10005,15 @@
               <a:t>&gt;&gt;&gt; </a:t>
             </a:r>
             <a:r>
-              <a:rPr lang="en-US" dirty="0" err="1">
-                <a:solidFill>
-                  <a:schemeClr val="accent6"/>
-                </a:solidFill>
-                <a:latin typeface="Consolas" panose="020B0609020204030204" pitchFamily="49" charset="0"/>
-                <a:ea typeface="Menlo" panose="020B0609030804020204" pitchFamily="49" charset="0"/>
-                <a:cs typeface="Consolas" panose="020B0609020204030204" pitchFamily="49" charset="0"/>
-              </a:rPr>
-              <a:t>bindc</a:t>
-            </a:r>
-            <a:r>
-              <a:rPr lang="en-US" dirty="0">
-                <a:solidFill>
-                  <a:schemeClr val="accent6"/>
-                </a:solidFill>
-                <a:latin typeface="Consolas" panose="020B0609020204030204" pitchFamily="49" charset="0"/>
-                <a:ea typeface="Menlo" panose="020B0609030804020204" pitchFamily="49" charset="0"/>
-                <a:cs typeface="Consolas" panose="020B0609020204030204" pitchFamily="49" charset="0"/>
-              </a:rPr>
-              <a:t> = partial(partial, c=10)</a:t>
+              <a:rPr lang="en-US" sz="2300" dirty="0">
+                <a:solidFill>
+                  <a:srgbClr val="E700E5"/>
+                </a:solidFill>
+                <a:latin typeface="Consolas" panose="020B0609020204030204" pitchFamily="49" charset="0"/>
+                <a:ea typeface="Menlo" panose="020B0609030804020204" pitchFamily="49" charset="0"/>
+                <a:cs typeface="Consolas" panose="020B0609020204030204" pitchFamily="49" charset="0"/>
+              </a:rPr>
+              <a:t>@partial(partial, c=10)</a:t>
             </a:r>
           </a:p>
           <a:p>
@@ -10032,58 +10021,39 @@
               <a:buNone/>
             </a:pPr>
             <a:r>
-              <a:rPr lang="en-US" dirty="0">
-                <a:latin typeface="Consolas" panose="020B0609020204030204" pitchFamily="49" charset="0"/>
-                <a:ea typeface="Menlo" panose="020B0609030804020204" pitchFamily="49" charset="0"/>
-                <a:cs typeface="Consolas" panose="020B0609020204030204" pitchFamily="49" charset="0"/>
-              </a:rPr>
-              <a:t>&gt;&gt;&gt; </a:t>
-            </a:r>
-            <a:r>
-              <a:rPr lang="en-US" dirty="0">
-                <a:solidFill>
-                  <a:srgbClr val="E700E5"/>
-                </a:solidFill>
-                <a:latin typeface="Consolas" panose="020B0609020204030204" pitchFamily="49" charset="0"/>
-                <a:ea typeface="Menlo" panose="020B0609030804020204" pitchFamily="49" charset="0"/>
-                <a:cs typeface="Consolas" panose="020B0609020204030204" pitchFamily="49" charset="0"/>
-              </a:rPr>
-              <a:t>@</a:t>
-            </a:r>
-            <a:r>
-              <a:rPr lang="en-US" dirty="0" err="1">
-                <a:solidFill>
-                  <a:srgbClr val="E700E5"/>
-                </a:solidFill>
-                <a:latin typeface="Consolas" panose="020B0609020204030204" pitchFamily="49" charset="0"/>
-                <a:ea typeface="Menlo" panose="020B0609030804020204" pitchFamily="49" charset="0"/>
-                <a:cs typeface="Consolas" panose="020B0609020204030204" pitchFamily="49" charset="0"/>
-              </a:rPr>
-              <a:t>bindc</a:t>
-            </a:r>
-            <a:endParaRPr lang="en-US" dirty="0">
-              <a:solidFill>
-                <a:srgbClr val="E700E5"/>
-              </a:solidFill>
-              <a:latin typeface="Consolas" panose="020B0609020204030204" pitchFamily="49" charset="0"/>
-              <a:ea typeface="Menlo" panose="020B0609030804020204" pitchFamily="49" charset="0"/>
-              <a:cs typeface="Consolas" panose="020B0609020204030204" pitchFamily="49" charset="0"/>
-            </a:endParaRPr>
+              <a:rPr lang="en-US" sz="2300" dirty="0">
+                <a:latin typeface="Consolas" panose="020B0609020204030204" pitchFamily="49" charset="0"/>
+                <a:ea typeface="Menlo" panose="020B0609030804020204" pitchFamily="49" charset="0"/>
+                <a:cs typeface="Consolas" panose="020B0609020204030204" pitchFamily="49" charset="0"/>
+              </a:rPr>
+              <a:t>... </a:t>
+            </a:r>
+            <a:r>
+              <a:rPr lang="en-US" sz="2300" dirty="0">
+                <a:solidFill>
+                  <a:schemeClr val="accent6"/>
+                </a:solidFill>
+                <a:latin typeface="Consolas" panose="020B0609020204030204" pitchFamily="49" charset="0"/>
+                <a:ea typeface="Menlo" panose="020B0609030804020204" pitchFamily="49" charset="0"/>
+                <a:cs typeface="Consolas" panose="020B0609020204030204" pitchFamily="49" charset="0"/>
+              </a:rPr>
+              <a:t>def foo(a, b, c):</a:t>
+            </a:r>
           </a:p>
           <a:p>
             <a:pPr marL="0" indent="0">
               <a:buNone/>
             </a:pPr>
             <a:r>
-              <a:rPr lang="en-US" dirty="0">
-                <a:latin typeface="Consolas" panose="020B0609020204030204" pitchFamily="49" charset="0"/>
-                <a:ea typeface="Menlo" panose="020B0609030804020204" pitchFamily="49" charset="0"/>
-                <a:cs typeface="Consolas" panose="020B0609020204030204" pitchFamily="49" charset="0"/>
-              </a:rPr>
-              <a:t>... </a:t>
-            </a:r>
-            <a:r>
-              <a:rPr lang="en-US" dirty="0">
+              <a:rPr lang="en-US" sz="2300" dirty="0">
+                <a:latin typeface="Consolas" panose="020B0609020204030204" pitchFamily="49" charset="0"/>
+                <a:ea typeface="Menlo" panose="020B0609030804020204" pitchFamily="49" charset="0"/>
+                <a:cs typeface="Consolas" panose="020B0609020204030204" pitchFamily="49" charset="0"/>
+              </a:rPr>
+              <a:t>...     </a:t>
+            </a:r>
+            <a:r>
+              <a:rPr lang="en-US" sz="2300" dirty="0">
                 <a:solidFill>
                   <a:schemeClr val="accent6"/>
                 </a:solidFill>
@@ -10091,7 +10061,7 @@
                 <a:ea typeface="Menlo" panose="020B0609030804020204" pitchFamily="49" charset="0"/>
                 <a:cs typeface="Consolas" panose="020B0609020204030204" pitchFamily="49" charset="0"/>
               </a:rPr>
-              <a:t>def foo(a, b, c):</a:t>
+              <a:t>return a + b + c</a:t>
             </a:r>
           </a:p>
           <a:p>
@@ -10099,23 +10069,12 @@
               <a:buNone/>
             </a:pPr>
             <a:r>
-              <a:rPr lang="en-US" dirty="0">
-                <a:latin typeface="Consolas" panose="020B0609020204030204" pitchFamily="49" charset="0"/>
-                <a:ea typeface="Menlo" panose="020B0609030804020204" pitchFamily="49" charset="0"/>
-                <a:cs typeface="Consolas" panose="020B0609020204030204" pitchFamily="49" charset="0"/>
-              </a:rPr>
-              <a:t>...     </a:t>
-            </a:r>
-            <a:r>
-              <a:rPr lang="en-US" dirty="0">
-                <a:solidFill>
-                  <a:schemeClr val="accent6"/>
-                </a:solidFill>
-                <a:latin typeface="Consolas" panose="020B0609020204030204" pitchFamily="49" charset="0"/>
-                <a:ea typeface="Menlo" panose="020B0609030804020204" pitchFamily="49" charset="0"/>
-                <a:cs typeface="Consolas" panose="020B0609020204030204" pitchFamily="49" charset="0"/>
-              </a:rPr>
-              <a:t>return a + b + c</a:t>
+              <a:rPr lang="en-US" sz="2300" dirty="0">
+                <a:latin typeface="Consolas" panose="020B0609020204030204" pitchFamily="49" charset="0"/>
+                <a:ea typeface="Menlo" panose="020B0609030804020204" pitchFamily="49" charset="0"/>
+                <a:cs typeface="Consolas" panose="020B0609020204030204" pitchFamily="49" charset="0"/>
+              </a:rPr>
+              <a:t>... </a:t>
             </a:r>
           </a:p>
           <a:p>
@@ -10123,12 +10082,23 @@
               <a:buNone/>
             </a:pPr>
             <a:r>
-              <a:rPr lang="en-US" dirty="0">
-                <a:latin typeface="Consolas" panose="020B0609020204030204" pitchFamily="49" charset="0"/>
-                <a:ea typeface="Menlo" panose="020B0609030804020204" pitchFamily="49" charset="0"/>
-                <a:cs typeface="Consolas" panose="020B0609020204030204" pitchFamily="49" charset="0"/>
-              </a:rPr>
-              <a:t>... </a:t>
+              <a:rPr lang="en-US" sz="2300" dirty="0">
+                <a:latin typeface="Consolas" panose="020B0609020204030204" pitchFamily="49" charset="0"/>
+                <a:ea typeface="Menlo" panose="020B0609030804020204" pitchFamily="49" charset="0"/>
+                <a:cs typeface="Consolas" panose="020B0609020204030204" pitchFamily="49" charset="0"/>
+              </a:rPr>
+              <a:t>&gt;&gt;&gt; </a:t>
+            </a:r>
+            <a:r>
+              <a:rPr lang="en-US" sz="2300" dirty="0">
+                <a:solidFill>
+                  <a:schemeClr val="accent6"/>
+                </a:solidFill>
+                <a:latin typeface="Consolas" panose="020B0609020204030204" pitchFamily="49" charset="0"/>
+                <a:ea typeface="Menlo" panose="020B0609030804020204" pitchFamily="49" charset="0"/>
+                <a:cs typeface="Consolas" panose="020B0609020204030204" pitchFamily="49" charset="0"/>
+              </a:rPr>
+              <a:t>foo(1, 2)</a:t>
             </a:r>
           </a:p>
           <a:p>
@@ -10136,23 +10106,12 @@
               <a:buNone/>
             </a:pPr>
             <a:r>
-              <a:rPr lang="en-US" dirty="0">
-                <a:latin typeface="Consolas" panose="020B0609020204030204" pitchFamily="49" charset="0"/>
-                <a:ea typeface="Menlo" panose="020B0609030804020204" pitchFamily="49" charset="0"/>
-                <a:cs typeface="Consolas" panose="020B0609020204030204" pitchFamily="49" charset="0"/>
-              </a:rPr>
-              <a:t>&gt;&gt;&gt; </a:t>
-            </a:r>
-            <a:r>
-              <a:rPr lang="en-US" dirty="0">
-                <a:solidFill>
-                  <a:schemeClr val="accent6"/>
-                </a:solidFill>
-                <a:latin typeface="Consolas" panose="020B0609020204030204" pitchFamily="49" charset="0"/>
-                <a:ea typeface="Menlo" panose="020B0609030804020204" pitchFamily="49" charset="0"/>
-                <a:cs typeface="Consolas" panose="020B0609020204030204" pitchFamily="49" charset="0"/>
-              </a:rPr>
-              <a:t>foo(1, 2)</a:t>
+              <a:rPr lang="en-US" sz="2300" dirty="0">
+                <a:latin typeface="Consolas" panose="020B0609020204030204" pitchFamily="49" charset="0"/>
+                <a:ea typeface="Menlo" panose="020B0609030804020204" pitchFamily="49" charset="0"/>
+                <a:cs typeface="Consolas" panose="020B0609020204030204" pitchFamily="49" charset="0"/>
+              </a:rPr>
+              <a:t>13</a:t>
             </a:r>
           </a:p>
           <a:p>
@@ -10160,12 +10119,34 @@
               <a:buNone/>
             </a:pPr>
             <a:r>
-              <a:rPr lang="en-US" dirty="0">
-                <a:latin typeface="Consolas" panose="020B0609020204030204" pitchFamily="49" charset="0"/>
-                <a:ea typeface="Menlo" panose="020B0609030804020204" pitchFamily="49" charset="0"/>
-                <a:cs typeface="Consolas" panose="020B0609020204030204" pitchFamily="49" charset="0"/>
-              </a:rPr>
-              <a:t>13</a:t>
+              <a:rPr lang="en-US" sz="2300" dirty="0">
+                <a:latin typeface="Consolas" panose="020B0609020204030204" pitchFamily="49" charset="0"/>
+                <a:ea typeface="Menlo" panose="020B0609030804020204" pitchFamily="49" charset="0"/>
+                <a:cs typeface="Consolas" panose="020B0609020204030204" pitchFamily="49" charset="0"/>
+              </a:rPr>
+              <a:t>&gt;&gt;&gt; </a:t>
+            </a:r>
+            <a:r>
+              <a:rPr lang="en-US" sz="2300" dirty="0" err="1">
+                <a:solidFill>
+                  <a:schemeClr val="accent6"/>
+                </a:solidFill>
+                <a:latin typeface="Consolas" panose="020B0609020204030204" pitchFamily="49" charset="0"/>
+                <a:ea typeface="Menlo" panose="020B0609030804020204" pitchFamily="49" charset="0"/>
+                <a:cs typeface="Consolas" panose="020B0609020204030204" pitchFamily="49" charset="0"/>
+              </a:rPr>
+              <a:t>what_is</a:t>
+            </a:r>
+            <a:r>
+              <a:rPr lang="en-US" sz="2300" dirty="0">
+                <a:solidFill>
+                  <a:schemeClr val="accent6"/>
+                </a:solidFill>
+                <a:latin typeface="Consolas" panose="020B0609020204030204" pitchFamily="49" charset="0"/>
+                <a:ea typeface="Menlo" panose="020B0609030804020204" pitchFamily="49" charset="0"/>
+                <a:cs typeface="Consolas" panose="020B0609020204030204" pitchFamily="49" charset="0"/>
+              </a:rPr>
+              <a:t> = partial(partial, partial)</a:t>
             </a:r>
           </a:p>
         </p:txBody>

</xml_diff>